<commit_message>
doplneneie dokumentacie a prezentacie
</commit_message>
<xml_diff>
--- a/_documentation/pres.pptx
+++ b/_documentation/pres.pptx
@@ -8,10 +8,11 @@
     <p:sldId id="256" r:id="rId2"/>
     <p:sldId id="257" r:id="rId3"/>
     <p:sldId id="258" r:id="rId4"/>
-    <p:sldId id="261" r:id="rId5"/>
-    <p:sldId id="259" r:id="rId6"/>
-    <p:sldId id="260" r:id="rId7"/>
-    <p:sldId id="262" r:id="rId8"/>
+    <p:sldId id="263" r:id="rId5"/>
+    <p:sldId id="261" r:id="rId6"/>
+    <p:sldId id="259" r:id="rId7"/>
+    <p:sldId id="260" r:id="rId8"/>
+    <p:sldId id="262" r:id="rId9"/>
   </p:sldIdLst>
   <p:sldSz cx="9144000" cy="6858000" type="screen4x3"/>
   <p:notesSz cx="6858000" cy="9144000"/>
@@ -295,7 +296,7 @@
             <a:fld id="{1B44CA89-A638-41F8-A4C9-FACEF5933D6A}" type="datetimeFigureOut">
               <a:rPr lang="sk-SK" smtClean="0"/>
               <a:pPr/>
-              <a:t>19. 12. 2013</a:t>
+              <a:t>20. 12. 2013</a:t>
             </a:fld>
             <a:endParaRPr lang="sk-SK" dirty="0"/>
           </a:p>
@@ -462,7 +463,7 @@
             <a:fld id="{1B44CA89-A638-41F8-A4C9-FACEF5933D6A}" type="datetimeFigureOut">
               <a:rPr lang="sk-SK" smtClean="0"/>
               <a:pPr/>
-              <a:t>19. 12. 2013</a:t>
+              <a:t>20. 12. 2013</a:t>
             </a:fld>
             <a:endParaRPr lang="sk-SK" dirty="0"/>
           </a:p>
@@ -639,7 +640,7 @@
             <a:fld id="{1B44CA89-A638-41F8-A4C9-FACEF5933D6A}" type="datetimeFigureOut">
               <a:rPr lang="sk-SK" smtClean="0"/>
               <a:pPr/>
-              <a:t>19. 12. 2013</a:t>
+              <a:t>20. 12. 2013</a:t>
             </a:fld>
             <a:endParaRPr lang="sk-SK" dirty="0"/>
           </a:p>
@@ -806,7 +807,7 @@
             <a:fld id="{1B44CA89-A638-41F8-A4C9-FACEF5933D6A}" type="datetimeFigureOut">
               <a:rPr lang="sk-SK" smtClean="0"/>
               <a:pPr/>
-              <a:t>19. 12. 2013</a:t>
+              <a:t>20. 12. 2013</a:t>
             </a:fld>
             <a:endParaRPr lang="sk-SK" dirty="0"/>
           </a:p>
@@ -1049,7 +1050,7 @@
             <a:fld id="{1B44CA89-A638-41F8-A4C9-FACEF5933D6A}" type="datetimeFigureOut">
               <a:rPr lang="sk-SK" smtClean="0"/>
               <a:pPr/>
-              <a:t>19. 12. 2013</a:t>
+              <a:t>20. 12. 2013</a:t>
             </a:fld>
             <a:endParaRPr lang="sk-SK" dirty="0"/>
           </a:p>
@@ -1334,7 +1335,7 @@
             <a:fld id="{1B44CA89-A638-41F8-A4C9-FACEF5933D6A}" type="datetimeFigureOut">
               <a:rPr lang="sk-SK" smtClean="0"/>
               <a:pPr/>
-              <a:t>19. 12. 2013</a:t>
+              <a:t>20. 12. 2013</a:t>
             </a:fld>
             <a:endParaRPr lang="sk-SK" dirty="0"/>
           </a:p>
@@ -1753,7 +1754,7 @@
             <a:fld id="{1B44CA89-A638-41F8-A4C9-FACEF5933D6A}" type="datetimeFigureOut">
               <a:rPr lang="sk-SK" smtClean="0"/>
               <a:pPr/>
-              <a:t>19. 12. 2013</a:t>
+              <a:t>20. 12. 2013</a:t>
             </a:fld>
             <a:endParaRPr lang="sk-SK" dirty="0"/>
           </a:p>
@@ -1868,7 +1869,7 @@
             <a:fld id="{1B44CA89-A638-41F8-A4C9-FACEF5933D6A}" type="datetimeFigureOut">
               <a:rPr lang="sk-SK" smtClean="0"/>
               <a:pPr/>
-              <a:t>19. 12. 2013</a:t>
+              <a:t>20. 12. 2013</a:t>
             </a:fld>
             <a:endParaRPr lang="sk-SK" dirty="0"/>
           </a:p>
@@ -1960,7 +1961,7 @@
             <a:fld id="{1B44CA89-A638-41F8-A4C9-FACEF5933D6A}" type="datetimeFigureOut">
               <a:rPr lang="sk-SK" smtClean="0"/>
               <a:pPr/>
-              <a:t>19. 12. 2013</a:t>
+              <a:t>20. 12. 2013</a:t>
             </a:fld>
             <a:endParaRPr lang="sk-SK" dirty="0"/>
           </a:p>
@@ -2234,7 +2235,7 @@
             <a:fld id="{1B44CA89-A638-41F8-A4C9-FACEF5933D6A}" type="datetimeFigureOut">
               <a:rPr lang="sk-SK" smtClean="0"/>
               <a:pPr/>
-              <a:t>19. 12. 2013</a:t>
+              <a:t>20. 12. 2013</a:t>
             </a:fld>
             <a:endParaRPr lang="sk-SK" dirty="0"/>
           </a:p>
@@ -2484,7 +2485,7 @@
             <a:fld id="{1B44CA89-A638-41F8-A4C9-FACEF5933D6A}" type="datetimeFigureOut">
               <a:rPr lang="sk-SK" smtClean="0"/>
               <a:pPr/>
-              <a:t>19. 12. 2013</a:t>
+              <a:t>20. 12. 2013</a:t>
             </a:fld>
             <a:endParaRPr lang="sk-SK" dirty="0"/>
           </a:p>
@@ -2694,7 +2695,7 @@
             <a:fld id="{1B44CA89-A638-41F8-A4C9-FACEF5933D6A}" type="datetimeFigureOut">
               <a:rPr lang="sk-SK" smtClean="0"/>
               <a:pPr/>
-              <a:t>19. 12. 2013</a:t>
+              <a:t>20. 12. 2013</a:t>
             </a:fld>
             <a:endParaRPr lang="sk-SK" dirty="0"/>
           </a:p>
@@ -3664,11 +3665,7 @@
           <a:p>
             <a:r>
               <a:rPr lang="sk-SK" dirty="0" smtClean="0"/>
-              <a:t>Vstupy a </a:t>
-            </a:r>
-            <a:r>
-              <a:rPr lang="sk-SK" smtClean="0"/>
-              <a:t>výstupy algoritmu</a:t>
+              <a:t>Vstupy a výstupy algoritmu</a:t>
             </a:r>
             <a:endParaRPr lang="sk-SK" dirty="0"/>
           </a:p>
@@ -3871,6 +3868,95 @@
             <p:ph type="title"/>
           </p:nvPr>
         </p:nvSpPr>
+        <p:spPr/>
+        <p:txBody>
+          <a:bodyPr/>
+          <a:lstStyle/>
+          <a:p>
+            <a:endParaRPr lang="sk-SK"/>
+          </a:p>
+        </p:txBody>
+      </p:sp>
+      <p:sp>
+        <p:nvSpPr>
+          <p:cNvPr id="3" name="Zástupný symbol obsahu 2"/>
+          <p:cNvSpPr>
+            <a:spLocks noGrp="1"/>
+          </p:cNvSpPr>
+          <p:nvPr>
+            <p:ph idx="1"/>
+          </p:nvPr>
+        </p:nvSpPr>
+        <p:spPr/>
+        <p:txBody>
+          <a:bodyPr/>
+          <a:lstStyle/>
+          <a:p>
+            <a:endParaRPr lang="sk-SK" dirty="0"/>
+          </a:p>
+        </p:txBody>
+      </p:sp>
+      <p:pic>
+        <p:nvPicPr>
+          <p:cNvPr id="1027" name="Picture 3" descr="D:\skola\MPOV\proj2\vutbr_mpov_terrain\_documentation\image.png"/>
+          <p:cNvPicPr>
+            <a:picLocks noChangeAspect="1" noChangeArrowheads="1"/>
+          </p:cNvPicPr>
+          <p:nvPr/>
+        </p:nvPicPr>
+        <p:blipFill>
+          <a:blip r:embed="rId2" cstate="print"/>
+          <a:srcRect/>
+          <a:stretch>
+            <a:fillRect/>
+          </a:stretch>
+        </p:blipFill>
+        <p:spPr bwMode="auto">
+          <a:xfrm>
+            <a:off x="1979712" y="2924944"/>
+            <a:ext cx="3168352" cy="2357843"/>
+          </a:xfrm>
+          <a:prstGeom prst="rect">
+            <a:avLst/>
+          </a:prstGeom>
+          <a:noFill/>
+        </p:spPr>
+      </p:pic>
+    </p:spTree>
+  </p:cSld>
+  <p:clrMapOvr>
+    <a:masterClrMapping/>
+  </p:clrMapOvr>
+</p:sld>
+</file>
+
+<file path=ppt/slides/slide5.xml><?xml version="1.0" encoding="utf-8"?>
+<p:sld xmlns:a="http://schemas.openxmlformats.org/drawingml/2006/main" xmlns:r="http://schemas.openxmlformats.org/officeDocument/2006/relationships" xmlns:p="http://schemas.openxmlformats.org/presentationml/2006/main">
+  <p:cSld>
+    <p:spTree>
+      <p:nvGrpSpPr>
+        <p:cNvPr id="1" name=""/>
+        <p:cNvGrpSpPr/>
+        <p:nvPr/>
+      </p:nvGrpSpPr>
+      <p:grpSpPr>
+        <a:xfrm>
+          <a:off x="0" y="0"/>
+          <a:ext cx="0" cy="0"/>
+          <a:chOff x="0" y="0"/>
+          <a:chExt cx="0" cy="0"/>
+        </a:xfrm>
+      </p:grpSpPr>
+      <p:sp>
+        <p:nvSpPr>
+          <p:cNvPr id="2" name="Nadpis 1"/>
+          <p:cNvSpPr>
+            <a:spLocks noGrp="1"/>
+          </p:cNvSpPr>
+          <p:nvPr>
+            <p:ph type="title"/>
+          </p:nvPr>
+        </p:nvSpPr>
         <p:spPr>
           <a:xfrm>
             <a:off x="539552" y="2708920"/>
@@ -3904,7 +3990,7 @@
 </p:sld>
 </file>
 
-<file path=ppt/slides/slide5.xml><?xml version="1.0" encoding="utf-8"?>
+<file path=ppt/slides/slide6.xml><?xml version="1.0" encoding="utf-8"?>
 <p:sld xmlns:a="http://schemas.openxmlformats.org/drawingml/2006/main" xmlns:r="http://schemas.openxmlformats.org/officeDocument/2006/relationships" xmlns:p="http://schemas.openxmlformats.org/presentationml/2006/main">
   <p:cSld>
     <p:bg>
@@ -4011,7 +4097,7 @@
 </p:sld>
 </file>
 
-<file path=ppt/slides/slide6.xml><?xml version="1.0" encoding="utf-8"?>
+<file path=ppt/slides/slide7.xml><?xml version="1.0" encoding="utf-8"?>
 <p:sld xmlns:a="http://schemas.openxmlformats.org/drawingml/2006/main" xmlns:r="http://schemas.openxmlformats.org/officeDocument/2006/relationships" xmlns:p="http://schemas.openxmlformats.org/presentationml/2006/main">
   <p:cSld>
     <p:bg>
@@ -4118,7 +4204,7 @@
 </p:sld>
 </file>
 
-<file path=ppt/slides/slide7.xml><?xml version="1.0" encoding="utf-8"?>
+<file path=ppt/slides/slide8.xml><?xml version="1.0" encoding="utf-8"?>
 <p:sld xmlns:a="http://schemas.openxmlformats.org/drawingml/2006/main" xmlns:r="http://schemas.openxmlformats.org/officeDocument/2006/relationships" xmlns:p="http://schemas.openxmlformats.org/presentationml/2006/main">
   <p:cSld>
     <p:bg>

</xml_diff>